<commit_message>
Add lecture & info
</commit_message>
<xml_diff>
--- a/ex/352-S20/lectures/08-ordering-flow-control.pptx
+++ b/ex/352-S20/lectures/08-ordering-flow-control.pptx
@@ -226,7 +226,7 @@
           <a:p>
             <a:fld id="{973C490B-630B-7F46-B6FE-05D0FD1689A8}" type="datetimeFigureOut">
               <a:rPr lang="en-US" smtClean="0"/>
-              <a:t>2/14/20</a:t>
+              <a:t>2/19/20</a:t>
             </a:fld>
             <a:endParaRPr lang="en-US"/>
           </a:p>
@@ -846,7 +846,7 @@
           <a:p>
             <a:fld id="{DEDCE603-2B12-5844-BEA7-E98E825B38C7}" type="datetimeFigureOut">
               <a:rPr lang="en-US" smtClean="0"/>
-              <a:t>2/14/20</a:t>
+              <a:t>2/19/20</a:t>
             </a:fld>
             <a:endParaRPr lang="en-US"/>
           </a:p>
@@ -1044,7 +1044,7 @@
           <a:p>
             <a:fld id="{DEDCE603-2B12-5844-BEA7-E98E825B38C7}" type="datetimeFigureOut">
               <a:rPr lang="en-US" smtClean="0"/>
-              <a:t>2/14/20</a:t>
+              <a:t>2/19/20</a:t>
             </a:fld>
             <a:endParaRPr lang="en-US"/>
           </a:p>
@@ -1252,7 +1252,7 @@
           <a:p>
             <a:fld id="{DEDCE603-2B12-5844-BEA7-E98E825B38C7}" type="datetimeFigureOut">
               <a:rPr lang="en-US" smtClean="0"/>
-              <a:t>2/14/20</a:t>
+              <a:t>2/19/20</a:t>
             </a:fld>
             <a:endParaRPr lang="en-US"/>
           </a:p>
@@ -1461,7 +1461,7 @@
           <a:p>
             <a:fld id="{DEDCE603-2B12-5844-BEA7-E98E825B38C7}" type="datetimeFigureOut">
               <a:rPr lang="en-US" smtClean="0"/>
-              <a:t>2/14/20</a:t>
+              <a:t>2/19/20</a:t>
             </a:fld>
             <a:endParaRPr lang="en-US"/>
           </a:p>
@@ -1736,7 +1736,7 @@
           <a:p>
             <a:fld id="{DEDCE603-2B12-5844-BEA7-E98E825B38C7}" type="datetimeFigureOut">
               <a:rPr lang="en-US" smtClean="0"/>
-              <a:t>2/14/20</a:t>
+              <a:t>2/19/20</a:t>
             </a:fld>
             <a:endParaRPr lang="en-US"/>
           </a:p>
@@ -2001,7 +2001,7 @@
           <a:p>
             <a:fld id="{DEDCE603-2B12-5844-BEA7-E98E825B38C7}" type="datetimeFigureOut">
               <a:rPr lang="en-US" smtClean="0"/>
-              <a:t>2/14/20</a:t>
+              <a:t>2/19/20</a:t>
             </a:fld>
             <a:endParaRPr lang="en-US"/>
           </a:p>
@@ -2413,7 +2413,7 @@
           <a:p>
             <a:fld id="{DEDCE603-2B12-5844-BEA7-E98E825B38C7}" type="datetimeFigureOut">
               <a:rPr lang="en-US" smtClean="0"/>
-              <a:t>2/14/20</a:t>
+              <a:t>2/19/20</a:t>
             </a:fld>
             <a:endParaRPr lang="en-US"/>
           </a:p>
@@ -2554,7 +2554,7 @@
           <a:p>
             <a:fld id="{DEDCE603-2B12-5844-BEA7-E98E825B38C7}" type="datetimeFigureOut">
               <a:rPr lang="en-US" smtClean="0"/>
-              <a:t>2/14/20</a:t>
+              <a:t>2/19/20</a:t>
             </a:fld>
             <a:endParaRPr lang="en-US"/>
           </a:p>
@@ -2667,7 +2667,7 @@
           <a:p>
             <a:fld id="{DEDCE603-2B12-5844-BEA7-E98E825B38C7}" type="datetimeFigureOut">
               <a:rPr lang="en-US" smtClean="0"/>
-              <a:t>2/14/20</a:t>
+              <a:t>2/19/20</a:t>
             </a:fld>
             <a:endParaRPr lang="en-US"/>
           </a:p>
@@ -2978,7 +2978,7 @@
           <a:p>
             <a:fld id="{DEDCE603-2B12-5844-BEA7-E98E825B38C7}" type="datetimeFigureOut">
               <a:rPr lang="en-US" smtClean="0"/>
-              <a:t>2/14/20</a:t>
+              <a:t>2/19/20</a:t>
             </a:fld>
             <a:endParaRPr lang="en-US"/>
           </a:p>
@@ -3266,7 +3266,7 @@
           <a:p>
             <a:fld id="{DEDCE603-2B12-5844-BEA7-E98E825B38C7}" type="datetimeFigureOut">
               <a:rPr lang="en-US" smtClean="0"/>
-              <a:t>2/14/20</a:t>
+              <a:t>2/19/20</a:t>
             </a:fld>
             <a:endParaRPr lang="en-US"/>
           </a:p>
@@ -3507,7 +3507,7 @@
           <a:p>
             <a:fld id="{DEDCE603-2B12-5844-BEA7-E98E825B38C7}" type="datetimeFigureOut">
               <a:rPr lang="en-US" smtClean="0"/>
-              <a:t>2/14/20</a:t>
+              <a:t>2/19/20</a:t>
             </a:fld>
             <a:endParaRPr lang="en-US"/>
           </a:p>
@@ -4421,7 +4421,15 @@
             </a:pPr>
             <a:r>
               <a:rPr lang="en-US" altLang="en-US" dirty="0"/>
-              <a:t>It is wasteful.  If there are errors, the sender will spend time retransmitting frames the receiver has already seen</a:t>
+              <a:t>It is wasteful.  If there are errors, the </a:t>
+            </a:r>
+            <a:r>
+              <a:rPr lang="en-US" altLang="en-US" dirty="0">
+                <a:solidFill>
+                  <a:srgbClr val="C00000"/>
+                </a:solidFill>
+              </a:rPr>
+              <a:t>sender will spend time retransmitting frames the receiver has already seen</a:t>
             </a:r>
           </a:p>
           <a:p>
@@ -4584,6 +4592,20 @@
             </a:r>
           </a:p>
           <a:p>
+            <a:r>
+              <a:rPr lang="en-US" altLang="en-US" dirty="0"/>
+              <a:t>Note that </a:t>
+            </a:r>
+            <a:r>
+              <a:rPr lang="en-US" altLang="en-US" dirty="0">
+                <a:solidFill>
+                  <a:srgbClr val="C00000"/>
+                </a:solidFill>
+              </a:rPr>
+              <a:t>timeout applies independently for each sequence #</a:t>
+            </a:r>
+          </a:p>
+          <a:p>
             <a:endParaRPr lang="en-US" dirty="0"/>
           </a:p>
         </p:txBody>
@@ -4598,6 +4620,232 @@
   <p:clrMapOvr>
     <a:masterClrMapping/>
   </p:clrMapOvr>
+  <p:timing>
+    <p:tnLst>
+      <p:par>
+        <p:cTn id="1" dur="indefinite" restart="never" nodeType="tmRoot">
+          <p:childTnLst>
+            <p:seq concurrent="1" nextAc="seek">
+              <p:cTn id="2" dur="indefinite" nodeType="mainSeq">
+                <p:childTnLst>
+                  <p:par>
+                    <p:cTn id="3" fill="hold">
+                      <p:stCondLst>
+                        <p:cond delay="indefinite"/>
+                      </p:stCondLst>
+                      <p:childTnLst>
+                        <p:par>
+                          <p:cTn id="4" fill="hold">
+                            <p:stCondLst>
+                              <p:cond delay="0"/>
+                            </p:stCondLst>
+                            <p:childTnLst>
+                              <p:par>
+                                <p:cTn id="5" presetID="1" presetClass="entr" presetSubtype="0" fill="hold" nodeType="clickEffect">
+                                  <p:stCondLst>
+                                    <p:cond delay="0"/>
+                                  </p:stCondLst>
+                                  <p:childTnLst>
+                                    <p:set>
+                                      <p:cBhvr>
+                                        <p:cTn id="6" dur="1" fill="hold">
+                                          <p:stCondLst>
+                                            <p:cond delay="0"/>
+                                          </p:stCondLst>
+                                        </p:cTn>
+                                        <p:tgtEl>
+                                          <p:spTgt spid="3">
+                                            <p:txEl>
+                                              <p:pRg st="1" end="1"/>
+                                            </p:txEl>
+                                          </p:spTgt>
+                                        </p:tgtEl>
+                                        <p:attrNameLst>
+                                          <p:attrName>style.visibility</p:attrName>
+                                        </p:attrNameLst>
+                                      </p:cBhvr>
+                                      <p:to>
+                                        <p:strVal val="visible"/>
+                                      </p:to>
+                                    </p:set>
+                                  </p:childTnLst>
+                                </p:cTn>
+                              </p:par>
+                            </p:childTnLst>
+                          </p:cTn>
+                        </p:par>
+                      </p:childTnLst>
+                    </p:cTn>
+                  </p:par>
+                  <p:par>
+                    <p:cTn id="7" fill="hold">
+                      <p:stCondLst>
+                        <p:cond delay="indefinite"/>
+                      </p:stCondLst>
+                      <p:childTnLst>
+                        <p:par>
+                          <p:cTn id="8" fill="hold">
+                            <p:stCondLst>
+                              <p:cond delay="0"/>
+                            </p:stCondLst>
+                            <p:childTnLst>
+                              <p:par>
+                                <p:cTn id="9" presetID="1" presetClass="entr" presetSubtype="0" fill="hold" nodeType="clickEffect">
+                                  <p:stCondLst>
+                                    <p:cond delay="0"/>
+                                  </p:stCondLst>
+                                  <p:childTnLst>
+                                    <p:set>
+                                      <p:cBhvr>
+                                        <p:cTn id="10" dur="1" fill="hold">
+                                          <p:stCondLst>
+                                            <p:cond delay="0"/>
+                                          </p:stCondLst>
+                                        </p:cTn>
+                                        <p:tgtEl>
+                                          <p:spTgt spid="3">
+                                            <p:txEl>
+                                              <p:pRg st="2" end="2"/>
+                                            </p:txEl>
+                                          </p:spTgt>
+                                        </p:tgtEl>
+                                        <p:attrNameLst>
+                                          <p:attrName>style.visibility</p:attrName>
+                                        </p:attrNameLst>
+                                      </p:cBhvr>
+                                      <p:to>
+                                        <p:strVal val="visible"/>
+                                      </p:to>
+                                    </p:set>
+                                  </p:childTnLst>
+                                </p:cTn>
+                              </p:par>
+                            </p:childTnLst>
+                          </p:cTn>
+                        </p:par>
+                      </p:childTnLst>
+                    </p:cTn>
+                  </p:par>
+                  <p:par>
+                    <p:cTn id="11" fill="hold">
+                      <p:stCondLst>
+                        <p:cond delay="indefinite"/>
+                      </p:stCondLst>
+                      <p:childTnLst>
+                        <p:par>
+                          <p:cTn id="12" fill="hold">
+                            <p:stCondLst>
+                              <p:cond delay="0"/>
+                            </p:stCondLst>
+                            <p:childTnLst>
+                              <p:par>
+                                <p:cTn id="13" presetID="1" presetClass="entr" presetSubtype="0" fill="hold" nodeType="clickEffect">
+                                  <p:stCondLst>
+                                    <p:cond delay="0"/>
+                                  </p:stCondLst>
+                                  <p:childTnLst>
+                                    <p:set>
+                                      <p:cBhvr>
+                                        <p:cTn id="14" dur="1" fill="hold">
+                                          <p:stCondLst>
+                                            <p:cond delay="0"/>
+                                          </p:stCondLst>
+                                        </p:cTn>
+                                        <p:tgtEl>
+                                          <p:spTgt spid="3">
+                                            <p:txEl>
+                                              <p:pRg st="3" end="3"/>
+                                            </p:txEl>
+                                          </p:spTgt>
+                                        </p:tgtEl>
+                                        <p:attrNameLst>
+                                          <p:attrName>style.visibility</p:attrName>
+                                        </p:attrNameLst>
+                                      </p:cBhvr>
+                                      <p:to>
+                                        <p:strVal val="visible"/>
+                                      </p:to>
+                                    </p:set>
+                                  </p:childTnLst>
+                                </p:cTn>
+                              </p:par>
+                            </p:childTnLst>
+                          </p:cTn>
+                        </p:par>
+                      </p:childTnLst>
+                    </p:cTn>
+                  </p:par>
+                  <p:par>
+                    <p:cTn id="15" fill="hold">
+                      <p:stCondLst>
+                        <p:cond delay="indefinite"/>
+                      </p:stCondLst>
+                      <p:childTnLst>
+                        <p:par>
+                          <p:cTn id="16" fill="hold">
+                            <p:stCondLst>
+                              <p:cond delay="0"/>
+                            </p:stCondLst>
+                            <p:childTnLst>
+                              <p:par>
+                                <p:cTn id="17" presetID="1" presetClass="entr" presetSubtype="0" fill="hold" nodeType="clickEffect">
+                                  <p:stCondLst>
+                                    <p:cond delay="0"/>
+                                  </p:stCondLst>
+                                  <p:childTnLst>
+                                    <p:set>
+                                      <p:cBhvr>
+                                        <p:cTn id="18" dur="1" fill="hold">
+                                          <p:stCondLst>
+                                            <p:cond delay="0"/>
+                                          </p:stCondLst>
+                                        </p:cTn>
+                                        <p:tgtEl>
+                                          <p:spTgt spid="3">
+                                            <p:txEl>
+                                              <p:pRg st="4" end="4"/>
+                                            </p:txEl>
+                                          </p:spTgt>
+                                        </p:tgtEl>
+                                        <p:attrNameLst>
+                                          <p:attrName>style.visibility</p:attrName>
+                                        </p:attrNameLst>
+                                      </p:cBhvr>
+                                      <p:to>
+                                        <p:strVal val="visible"/>
+                                      </p:to>
+                                    </p:set>
+                                  </p:childTnLst>
+                                </p:cTn>
+                              </p:par>
+                            </p:childTnLst>
+                          </p:cTn>
+                        </p:par>
+                      </p:childTnLst>
+                    </p:cTn>
+                  </p:par>
+                </p:childTnLst>
+              </p:cTn>
+              <p:prevCondLst>
+                <p:cond evt="onPrev" delay="0">
+                  <p:tgtEl>
+                    <p:sldTgt/>
+                  </p:tgtEl>
+                </p:cond>
+              </p:prevCondLst>
+              <p:nextCondLst>
+                <p:cond evt="onNext" delay="0">
+                  <p:tgtEl>
+                    <p:sldTgt/>
+                  </p:tgtEl>
+                </p:cond>
+              </p:nextCondLst>
+            </p:seq>
+          </p:childTnLst>
+        </p:cTn>
+      </p:par>
+    </p:tnLst>
+  </p:timing>
 </p:sld>
 </file>
 
@@ -4641,7 +4889,7 @@
           <a:p>
             <a:r>
               <a:rPr lang="en-US" dirty="0"/>
-              <a:t>Selective repeat</a:t>
+              <a:t>Selective repeat with cumulative ACK</a:t>
             </a:r>
           </a:p>
         </p:txBody>
@@ -6140,10 +6388,10 @@
               <a:buNone/>
             </a:pPr>
             <a:r>
-              <a:rPr lang="en-US" altLang="en-US" sz="1000">
+              <a:rPr lang="en-US" altLang="en-US" sz="1000" dirty="0">
                 <a:latin typeface="Arial" panose="020B0604020202020204" pitchFamily="34" charset="0"/>
               </a:rPr>
-              <a:t>ACK 0</a:t>
+              <a:t>ACK 1</a:t>
             </a:r>
           </a:p>
         </p:txBody>
@@ -8351,10 +8599,10 @@
               <a:buNone/>
             </a:pPr>
             <a:r>
-              <a:rPr lang="en-US" altLang="en-US" sz="1000">
+              <a:rPr lang="en-US" altLang="en-US" sz="1000" dirty="0">
                 <a:latin typeface="Arial" panose="020B0604020202020204" pitchFamily="34" charset="0"/>
               </a:rPr>
-              <a:t>ACK 1</a:t>
+              <a:t>ACK 2</a:t>
             </a:r>
           </a:p>
         </p:txBody>
@@ -10256,10 +10504,10 @@
               <a:buNone/>
             </a:pPr>
             <a:r>
-              <a:rPr lang="en-US" altLang="en-US" sz="1000">
+              <a:rPr lang="en-US" altLang="en-US" sz="1000" dirty="0">
                 <a:latin typeface="Arial" panose="020B0604020202020204" pitchFamily="34" charset="0"/>
               </a:rPr>
-              <a:t>ACK 4</a:t>
+              <a:t>ACK 5</a:t>
             </a:r>
           </a:p>
         </p:txBody>
@@ -10980,10 +11228,10 @@
               <a:buNone/>
             </a:pPr>
             <a:r>
-              <a:rPr lang="en-US" altLang="en-US" sz="1000">
+              <a:rPr lang="en-US" altLang="en-US" sz="1000" dirty="0">
                 <a:latin typeface="Arial" panose="020B0604020202020204" pitchFamily="34" charset="0"/>
               </a:rPr>
-              <a:t>ACK 5</a:t>
+              <a:t>ACK 6</a:t>
             </a:r>
           </a:p>
         </p:txBody>
@@ -11505,10 +11753,10 @@
               <a:buNone/>
             </a:pPr>
             <a:r>
-              <a:rPr lang="en-US" altLang="en-US" sz="1000">
+              <a:rPr lang="en-US" altLang="en-US" sz="1000" dirty="0">
                 <a:latin typeface="Arial" panose="020B0604020202020204" pitchFamily="34" charset="0"/>
               </a:rPr>
-              <a:t>ACK 6</a:t>
+              <a:t>ACK 7</a:t>
             </a:r>
           </a:p>
         </p:txBody>
@@ -12156,8 +12404,8 @@
         </p:nvSpPr>
         <p:spPr bwMode="auto">
           <a:xfrm rot="16924536">
-            <a:off x="5812632" y="3017045"/>
-            <a:ext cx="647700" cy="246063"/>
+            <a:off x="5851147" y="3016645"/>
+            <a:ext cx="570669" cy="246863"/>
           </a:xfrm>
           <a:prstGeom prst="rect">
             <a:avLst/>
@@ -12343,10 +12591,13 @@
               <a:buNone/>
             </a:pPr>
             <a:r>
-              <a:rPr lang="en-US" altLang="en-US" sz="1000">
+              <a:rPr lang="en-US" altLang="en-US" sz="1000" b="1" dirty="0">
+                <a:solidFill>
+                  <a:srgbClr val="C00000"/>
+                </a:solidFill>
                 <a:latin typeface="Arial" panose="020B0604020202020204" pitchFamily="34" charset="0"/>
               </a:rPr>
-              <a:t>NACK 2</a:t>
+              <a:t>ACK 2</a:t>
             </a:r>
           </a:p>
         </p:txBody>
@@ -12425,8 +12676,8 @@
         </p:nvSpPr>
         <p:spPr bwMode="auto">
           <a:xfrm rot="16924536">
-            <a:off x="6610350" y="3201988"/>
-            <a:ext cx="647700" cy="247650"/>
+            <a:off x="6648865" y="3202381"/>
+            <a:ext cx="570669" cy="246863"/>
           </a:xfrm>
           <a:prstGeom prst="rect">
             <a:avLst/>
@@ -12612,10 +12863,13 @@
               <a:buNone/>
             </a:pPr>
             <a:r>
-              <a:rPr lang="en-US" altLang="en-US" sz="1000">
+              <a:rPr lang="en-US" altLang="en-US" sz="1000" b="1" dirty="0">
+                <a:solidFill>
+                  <a:srgbClr val="C00000"/>
+                </a:solidFill>
                 <a:latin typeface="Arial" panose="020B0604020202020204" pitchFamily="34" charset="0"/>
               </a:rPr>
-              <a:t>NACK 2</a:t>
+              <a:t>ACK 2</a:t>
             </a:r>
           </a:p>
         </p:txBody>
@@ -21754,7 +22008,7 @@
         <p:spPr>
           <a:xfrm>
             <a:off x="5686386" y="5546387"/>
-            <a:ext cx="2402341" cy="830997"/>
+            <a:ext cx="2402341" cy="1200329"/>
           </a:xfrm>
           <a:prstGeom prst="rect">
             <a:avLst/>
@@ -21772,7 +22026,7 @@
               <a:rPr lang="en-US" sz="2400" dirty="0">
                 <a:latin typeface="Helvetica" pitchFamily="2" charset="0"/>
               </a:rPr>
-              <a:t>Last sequence  # expected</a:t>
+              <a:t>Highest sequence  # accepted</a:t>
             </a:r>
           </a:p>
         </p:txBody>
@@ -24421,7 +24675,23 @@
           <a:p>
             <a:r>
               <a:rPr lang="en-US" dirty="0"/>
-              <a:t>A TCP receiver can only release this data to the application if the data is in order relative to all other data already read by the application</a:t>
+              <a:t>TCP receiver </a:t>
+            </a:r>
+            <a:r>
+              <a:rPr lang="en-US"/>
+              <a:t>software only releases </a:t>
+            </a:r>
+            <a:r>
+              <a:rPr lang="en-US" dirty="0"/>
+              <a:t>this data to the application if the data is </a:t>
+            </a:r>
+            <a:r>
+              <a:rPr lang="en-US" dirty="0">
+                <a:solidFill>
+                  <a:srgbClr val="C00000"/>
+                </a:solidFill>
+              </a:rPr>
+              <a:t>in order relative to all other data already read by the application</a:t>
             </a:r>
           </a:p>
         </p:txBody>
@@ -26892,7 +27162,12 @@
             <p:ph idx="1"/>
           </p:nvPr>
         </p:nvSpPr>
-        <p:spPr/>
+        <p:spPr>
+          <a:xfrm>
+            <a:off x="838200" y="1825625"/>
+            <a:ext cx="10515600" cy="4545358"/>
+          </a:xfrm>
+        </p:spPr>
         <p:txBody>
           <a:bodyPr>
             <a:normAutofit/>
@@ -26901,13 +27176,8 @@
           <a:p>
             <a:r>
               <a:rPr lang="en-US" dirty="0"/>
-              <a:t>Mid-term 1 next </a:t>
+              <a:t>Mid-term 1 Friday in class</a:t>
             </a:r>
-            <a:r>
-              <a:rPr lang="en-US"/>
-              <a:t>Wednesday in class</a:t>
-            </a:r>
-            <a:endParaRPr lang="en-US" dirty="0"/>
           </a:p>
           <a:p>
             <a:pPr lvl="1"/>
@@ -26937,31 +27207,23 @@
             <a:pPr lvl="1"/>
             <a:r>
               <a:rPr lang="en-US" dirty="0"/>
-              <a:t>Mid-term may contain a few more questions</a:t>
+              <a:t>Review worked in recitation</a:t>
             </a:r>
           </a:p>
           <a:p>
             <a:pPr lvl="1"/>
             <a:r>
               <a:rPr lang="en-US" dirty="0"/>
-              <a:t>Mid-term may contain more challenging questions</a:t>
+              <a:t>Mid-term may contain a few more questions, more challenging questions</a:t>
             </a:r>
           </a:p>
           <a:p>
-            <a:pPr lvl="1"/>
             <a:endParaRPr lang="en-US" dirty="0"/>
           </a:p>
           <a:p>
             <a:r>
               <a:rPr lang="en-US" dirty="0"/>
-              <a:t>Feel free to post questions about the review on Piazza</a:t>
-            </a:r>
-          </a:p>
-          <a:p>
-            <a:pPr lvl="1"/>
-            <a:r>
-              <a:rPr lang="en-US" dirty="0"/>
-              <a:t>Sooner the better, if you want to hear back from us in time</a:t>
+              <a:t>Learning Assistant (LA) program: looking for 352 for next year</a:t>
             </a:r>
           </a:p>
         </p:txBody>
@@ -35541,7 +35803,15 @@
             <a:pPr lvl="1"/>
             <a:r>
               <a:rPr lang="en-US" dirty="0"/>
-              <a:t>Error detection using checksum</a:t>
+              <a:t>Error detection using </a:t>
+            </a:r>
+            <a:r>
+              <a:rPr lang="en-US" dirty="0">
+                <a:solidFill>
+                  <a:srgbClr val="C00000"/>
+                </a:solidFill>
+              </a:rPr>
+              <a:t>checksum</a:t>
             </a:r>
           </a:p>
           <a:p>
@@ -35587,13 +35857,8 @@
             <a:pPr lvl="1"/>
             <a:r>
               <a:rPr lang="en-US" dirty="0"/>
-              <a:t>Main problem: low data rate</a:t>
+              <a:t>Main problem: low data rate/throughput</a:t>
             </a:r>
-            <a:r>
-              <a:rPr lang="en-US"/>
-              <a:t>/throughput</a:t>
-            </a:r>
-            <a:endParaRPr lang="en-US" dirty="0"/>
           </a:p>
           <a:p>
             <a:r>
@@ -35605,14 +35870,26 @@
             <a:pPr lvl="1"/>
             <a:r>
               <a:rPr lang="en-US" dirty="0"/>
-              <a:t>Key idea: increase the number of in-flight packets</a:t>
+              <a:t>Key idea: increase the number of </a:t>
+            </a:r>
+            <a:r>
+              <a:rPr lang="en-US" dirty="0">
+                <a:solidFill>
+                  <a:srgbClr val="C00000"/>
+                </a:solidFill>
+              </a:rPr>
+              <a:t>in-flight</a:t>
+            </a:r>
+            <a:r>
+              <a:rPr lang="en-US" dirty="0"/>
+              <a:t> packets</a:t>
             </a:r>
           </a:p>
           <a:p>
             <a:pPr lvl="1"/>
             <a:r>
               <a:rPr lang="en-US" dirty="0"/>
-              <a:t>How does throughput increase?</a:t>
+              <a:t>Why does throughput increase?</a:t>
             </a:r>
           </a:p>
           <a:p>
@@ -36025,15 +36302,7 @@
             </a:pPr>
             <a:r>
               <a:rPr lang="en-US" altLang="en-US" sz="2400" dirty="0"/>
-              <a:t>A few packets </a:t>
-            </a:r>
-            <a:r>
-              <a:rPr lang="en-US" altLang="en-US" sz="2400" dirty="0" err="1"/>
-              <a:t>aon</a:t>
-            </a:r>
-            <a:r>
-              <a:rPr lang="en-US" altLang="en-US" sz="2400" dirty="0"/>
-              <a:t> the way while, concurrently, new packets are transmitted</a:t>
+              <a:t>A few packets on the way while, concurrently, new packets are transmitted</a:t>
             </a:r>
           </a:p>
           <a:p>
@@ -41164,8 +41433,8 @@
         </p:nvSpPr>
         <p:spPr bwMode="auto">
           <a:xfrm>
-            <a:off x="4770440" y="1905000"/>
-            <a:ext cx="1755775" cy="336550"/>
+            <a:off x="5340808" y="1905000"/>
+            <a:ext cx="615040" cy="339196"/>
           </a:xfrm>
           <a:prstGeom prst="rect">
             <a:avLst/>
@@ -41351,10 +41620,10 @@
               <a:buNone/>
             </a:pPr>
             <a:r>
-              <a:rPr lang="en-US" altLang="en-US" sz="1600" b="1">
+              <a:rPr lang="en-US" altLang="en-US" sz="1600" b="1" dirty="0">
                 <a:latin typeface="Arial" panose="020B0604020202020204" pitchFamily="34" charset="0"/>
               </a:rPr>
-              <a:t>Timeout interval</a:t>
+              <a:t>RTO</a:t>
             </a:r>
           </a:p>
         </p:txBody>
@@ -41562,10 +41831,10 @@
               <a:buNone/>
             </a:pPr>
             <a:r>
-              <a:rPr lang="en-US" altLang="en-US" sz="1000">
+              <a:rPr lang="en-US" altLang="en-US" sz="1000" dirty="0">
                 <a:latin typeface="Arial" panose="020B0604020202020204" pitchFamily="34" charset="0"/>
               </a:rPr>
-              <a:t>ACK 0</a:t>
+              <a:t>ACK 1</a:t>
             </a:r>
           </a:p>
         </p:txBody>
@@ -43773,10 +44042,10 @@
               <a:buNone/>
             </a:pPr>
             <a:r>
-              <a:rPr lang="en-US" altLang="en-US" sz="1000">
+              <a:rPr lang="en-US" altLang="en-US" sz="1000" dirty="0">
                 <a:latin typeface="Arial" panose="020B0604020202020204" pitchFamily="34" charset="0"/>
               </a:rPr>
-              <a:t>ACK 1</a:t>
+              <a:t>ACK 2</a:t>
             </a:r>
           </a:p>
         </p:txBody>
@@ -46106,10 +46375,10 @@
               <a:buNone/>
             </a:pPr>
             <a:r>
-              <a:rPr lang="en-US" altLang="en-US" sz="1000">
+              <a:rPr lang="en-US" altLang="en-US" sz="1000" dirty="0">
                 <a:latin typeface="Arial" panose="020B0604020202020204" pitchFamily="34" charset="0"/>
               </a:rPr>
-              <a:t>ACK 2</a:t>
+              <a:t>ACK 3</a:t>
             </a:r>
           </a:p>
         </p:txBody>
@@ -47798,10 +48067,10 @@
               <a:buNone/>
             </a:pPr>
             <a:r>
-              <a:rPr lang="en-US" altLang="en-US" sz="1000">
+              <a:rPr lang="en-US" altLang="en-US" sz="1000" dirty="0">
                 <a:latin typeface="Arial" panose="020B0604020202020204" pitchFamily="34" charset="0"/>
               </a:rPr>
-              <a:t>ACK 3</a:t>
+              <a:t>ACK 4</a:t>
             </a:r>
           </a:p>
         </p:txBody>
@@ -48009,10 +48278,10 @@
               <a:buNone/>
             </a:pPr>
             <a:r>
-              <a:rPr lang="en-US" altLang="en-US" sz="1000">
+              <a:rPr lang="en-US" altLang="en-US" sz="1000" dirty="0">
                 <a:latin typeface="Arial" panose="020B0604020202020204" pitchFamily="34" charset="0"/>
               </a:rPr>
-              <a:t>ACK 4</a:t>
+              <a:t>ACK 5</a:t>
             </a:r>
           </a:p>
         </p:txBody>
@@ -48278,10 +48547,10 @@
               <a:buNone/>
             </a:pPr>
             <a:r>
-              <a:rPr lang="en-US" altLang="en-US" sz="1000">
+              <a:rPr lang="en-US" altLang="en-US" sz="1000" dirty="0">
                 <a:latin typeface="Arial" panose="020B0604020202020204" pitchFamily="34" charset="0"/>
               </a:rPr>
-              <a:t>ACK 5</a:t>
+              <a:t>ACK 6</a:t>
             </a:r>
           </a:p>
         </p:txBody>
@@ -48616,7 +48885,7 @@
         </p:nvSpPr>
         <p:spPr bwMode="auto">
           <a:xfrm rot="16836050">
-            <a:off x="9274670" y="3423046"/>
+            <a:off x="9286862" y="3423046"/>
             <a:ext cx="554639" cy="246863"/>
           </a:xfrm>
           <a:prstGeom prst="rect">
@@ -48803,10 +49072,10 @@
               <a:buNone/>
             </a:pPr>
             <a:r>
-              <a:rPr lang="en-US" altLang="en-US" sz="1000">
+              <a:rPr lang="en-US" altLang="en-US" sz="1000" dirty="0">
                 <a:latin typeface="Arial" panose="020B0604020202020204" pitchFamily="34" charset="0"/>
               </a:rPr>
-              <a:t>ACK 6</a:t>
+              <a:t>ACK 7</a:t>
             </a:r>
           </a:p>
         </p:txBody>

</xml_diff>